<commit_message>
Removed arenicola from figures and separated tables
</commit_message>
<xml_diff>
--- a/figures/phylogeneticTrees/52taxa_raxml500-tree-final.pptx
+++ b/figures/phylogeneticTrees/52taxa_raxml500-tree-final.pptx
@@ -243,7 +243,7 @@
           <a:p>
             <a:fld id="{52CD387F-B953-4742-A2EF-49CBB47D9953}" type="datetimeFigureOut">
               <a:rPr lang="ko-KR" altLang="en-US" smtClean="0"/>
-              <a:t>2020-10-08</a:t>
+              <a:t>2020-11-16</a:t>
             </a:fld>
             <a:endParaRPr lang="ko-KR" altLang="en-US"/>
           </a:p>
@@ -413,7 +413,7 @@
           <a:p>
             <a:fld id="{52CD387F-B953-4742-A2EF-49CBB47D9953}" type="datetimeFigureOut">
               <a:rPr lang="ko-KR" altLang="en-US" smtClean="0"/>
-              <a:t>2020-10-08</a:t>
+              <a:t>2020-11-16</a:t>
             </a:fld>
             <a:endParaRPr lang="ko-KR" altLang="en-US"/>
           </a:p>
@@ -593,7 +593,7 @@
           <a:p>
             <a:fld id="{52CD387F-B953-4742-A2EF-49CBB47D9953}" type="datetimeFigureOut">
               <a:rPr lang="ko-KR" altLang="en-US" smtClean="0"/>
-              <a:t>2020-10-08</a:t>
+              <a:t>2020-11-16</a:t>
             </a:fld>
             <a:endParaRPr lang="ko-KR" altLang="en-US"/>
           </a:p>
@@ -763,7 +763,7 @@
           <a:p>
             <a:fld id="{52CD387F-B953-4742-A2EF-49CBB47D9953}" type="datetimeFigureOut">
               <a:rPr lang="ko-KR" altLang="en-US" smtClean="0"/>
-              <a:t>2020-10-08</a:t>
+              <a:t>2020-11-16</a:t>
             </a:fld>
             <a:endParaRPr lang="ko-KR" altLang="en-US"/>
           </a:p>
@@ -1007,7 +1007,7 @@
           <a:p>
             <a:fld id="{52CD387F-B953-4742-A2EF-49CBB47D9953}" type="datetimeFigureOut">
               <a:rPr lang="ko-KR" altLang="en-US" smtClean="0"/>
-              <a:t>2020-10-08</a:t>
+              <a:t>2020-11-16</a:t>
             </a:fld>
             <a:endParaRPr lang="ko-KR" altLang="en-US"/>
           </a:p>
@@ -1239,7 +1239,7 @@
           <a:p>
             <a:fld id="{52CD387F-B953-4742-A2EF-49CBB47D9953}" type="datetimeFigureOut">
               <a:rPr lang="ko-KR" altLang="en-US" smtClean="0"/>
-              <a:t>2020-10-08</a:t>
+              <a:t>2020-11-16</a:t>
             </a:fld>
             <a:endParaRPr lang="ko-KR" altLang="en-US"/>
           </a:p>
@@ -1606,7 +1606,7 @@
           <a:p>
             <a:fld id="{52CD387F-B953-4742-A2EF-49CBB47D9953}" type="datetimeFigureOut">
               <a:rPr lang="ko-KR" altLang="en-US" smtClean="0"/>
-              <a:t>2020-10-08</a:t>
+              <a:t>2020-11-16</a:t>
             </a:fld>
             <a:endParaRPr lang="ko-KR" altLang="en-US"/>
           </a:p>
@@ -1724,7 +1724,7 @@
           <a:p>
             <a:fld id="{52CD387F-B953-4742-A2EF-49CBB47D9953}" type="datetimeFigureOut">
               <a:rPr lang="ko-KR" altLang="en-US" smtClean="0"/>
-              <a:t>2020-10-08</a:t>
+              <a:t>2020-11-16</a:t>
             </a:fld>
             <a:endParaRPr lang="ko-KR" altLang="en-US"/>
           </a:p>
@@ -1819,7 +1819,7 @@
           <a:p>
             <a:fld id="{52CD387F-B953-4742-A2EF-49CBB47D9953}" type="datetimeFigureOut">
               <a:rPr lang="ko-KR" altLang="en-US" smtClean="0"/>
-              <a:t>2020-10-08</a:t>
+              <a:t>2020-11-16</a:t>
             </a:fld>
             <a:endParaRPr lang="ko-KR" altLang="en-US"/>
           </a:p>
@@ -2096,7 +2096,7 @@
           <a:p>
             <a:fld id="{52CD387F-B953-4742-A2EF-49CBB47D9953}" type="datetimeFigureOut">
               <a:rPr lang="ko-KR" altLang="en-US" smtClean="0"/>
-              <a:t>2020-10-08</a:t>
+              <a:t>2020-11-16</a:t>
             </a:fld>
             <a:endParaRPr lang="ko-KR" altLang="en-US"/>
           </a:p>
@@ -2353,7 +2353,7 @@
           <a:p>
             <a:fld id="{52CD387F-B953-4742-A2EF-49CBB47D9953}" type="datetimeFigureOut">
               <a:rPr lang="ko-KR" altLang="en-US" smtClean="0"/>
-              <a:t>2020-10-08</a:t>
+              <a:t>2020-11-16</a:t>
             </a:fld>
             <a:endParaRPr lang="ko-KR" altLang="en-US"/>
           </a:p>
@@ -2566,7 +2566,7 @@
           <a:p>
             <a:fld id="{52CD387F-B953-4742-A2EF-49CBB47D9953}" type="datetimeFigureOut">
               <a:rPr lang="ko-KR" altLang="en-US" smtClean="0"/>
-              <a:t>2020-10-08</a:t>
+              <a:t>2020-11-16</a:t>
             </a:fld>
             <a:endParaRPr lang="ko-KR" altLang="en-US"/>
           </a:p>
@@ -2992,7 +2992,7 @@
             <a:avLst/>
           </a:prstGeom>
           <a:solidFill>
-            <a:srgbClr val="FFA2A2"/>
+            <a:srgbClr val="D39FE5"/>
           </a:solidFill>
           <a:ln>
             <a:noFill/>
@@ -3044,7 +3044,7 @@
             <a:avLst/>
           </a:prstGeom>
           <a:solidFill>
-            <a:srgbClr val="F0B682"/>
+            <a:srgbClr val="89D1E7"/>
           </a:solidFill>
           <a:ln>
             <a:noFill/>
@@ -3096,7 +3096,7 @@
             <a:avLst/>
           </a:prstGeom>
           <a:solidFill>
-            <a:srgbClr val="C6CE86"/>
+            <a:srgbClr val="94D094"/>
           </a:solidFill>
           <a:ln>
             <a:noFill/>
@@ -3148,7 +3148,7 @@
             <a:avLst/>
           </a:prstGeom>
           <a:solidFill>
-            <a:srgbClr val="90DFB0"/>
+            <a:srgbClr val="F4C37C"/>
           </a:solidFill>
           <a:ln>
             <a:noFill/>
@@ -3200,7 +3200,7 @@
             <a:avLst/>
           </a:prstGeom>
           <a:solidFill>
-            <a:srgbClr val="62E8EC"/>
+            <a:srgbClr val="EEA0A0"/>
           </a:solidFill>
           <a:ln>
             <a:noFill/>

</xml_diff>